<commit_message>
update: 06/05 개발 사항
</commit_message>
<xml_diff>
--- a/CYJ/LePl 개발 일지.pptx
+++ b/CYJ/LePl 개발 일지.pptx
@@ -17,6 +17,11 @@
     <p:sldId id="265" r:id="rId11"/>
     <p:sldId id="266" r:id="rId12"/>
     <p:sldId id="267" r:id="rId13"/>
+    <p:sldId id="268" r:id="rId14"/>
+    <p:sldId id="269" r:id="rId15"/>
+    <p:sldId id="270" r:id="rId16"/>
+    <p:sldId id="271" r:id="rId17"/>
+    <p:sldId id="272" r:id="rId18"/>
   </p:sldIdLst>
   <p:sldSz cx="12192000" cy="6858000"/>
   <p:notesSz cx="6858000" cy="9144000"/>
@@ -270,7 +275,7 @@
           <a:p>
             <a:fld id="{F6423F3F-CC5F-4781-A2BC-2D2890007BDA}" type="datetimeFigureOut">
               <a:rPr lang="ko-KR" altLang="en-US" smtClean="0"/>
-              <a:t>2023-05-15</a:t>
+              <a:t>2023-06-05</a:t>
             </a:fld>
             <a:endParaRPr lang="ko-KR" altLang="en-US"/>
           </a:p>
@@ -468,7 +473,7 @@
           <a:p>
             <a:fld id="{F6423F3F-CC5F-4781-A2BC-2D2890007BDA}" type="datetimeFigureOut">
               <a:rPr lang="ko-KR" altLang="en-US" smtClean="0"/>
-              <a:t>2023-05-15</a:t>
+              <a:t>2023-06-05</a:t>
             </a:fld>
             <a:endParaRPr lang="ko-KR" altLang="en-US"/>
           </a:p>
@@ -676,7 +681,7 @@
           <a:p>
             <a:fld id="{F6423F3F-CC5F-4781-A2BC-2D2890007BDA}" type="datetimeFigureOut">
               <a:rPr lang="ko-KR" altLang="en-US" smtClean="0"/>
-              <a:t>2023-05-15</a:t>
+              <a:t>2023-06-05</a:t>
             </a:fld>
             <a:endParaRPr lang="ko-KR" altLang="en-US"/>
           </a:p>
@@ -874,7 +879,7 @@
           <a:p>
             <a:fld id="{F6423F3F-CC5F-4781-A2BC-2D2890007BDA}" type="datetimeFigureOut">
               <a:rPr lang="ko-KR" altLang="en-US" smtClean="0"/>
-              <a:t>2023-05-15</a:t>
+              <a:t>2023-06-05</a:t>
             </a:fld>
             <a:endParaRPr lang="ko-KR" altLang="en-US"/>
           </a:p>
@@ -1149,7 +1154,7 @@
           <a:p>
             <a:fld id="{F6423F3F-CC5F-4781-A2BC-2D2890007BDA}" type="datetimeFigureOut">
               <a:rPr lang="ko-KR" altLang="en-US" smtClean="0"/>
-              <a:t>2023-05-15</a:t>
+              <a:t>2023-06-05</a:t>
             </a:fld>
             <a:endParaRPr lang="ko-KR" altLang="en-US"/>
           </a:p>
@@ -1414,7 +1419,7 @@
           <a:p>
             <a:fld id="{F6423F3F-CC5F-4781-A2BC-2D2890007BDA}" type="datetimeFigureOut">
               <a:rPr lang="ko-KR" altLang="en-US" smtClean="0"/>
-              <a:t>2023-05-15</a:t>
+              <a:t>2023-06-05</a:t>
             </a:fld>
             <a:endParaRPr lang="ko-KR" altLang="en-US"/>
           </a:p>
@@ -1826,7 +1831,7 @@
           <a:p>
             <a:fld id="{F6423F3F-CC5F-4781-A2BC-2D2890007BDA}" type="datetimeFigureOut">
               <a:rPr lang="ko-KR" altLang="en-US" smtClean="0"/>
-              <a:t>2023-05-15</a:t>
+              <a:t>2023-06-05</a:t>
             </a:fld>
             <a:endParaRPr lang="ko-KR" altLang="en-US"/>
           </a:p>
@@ -1967,7 +1972,7 @@
           <a:p>
             <a:fld id="{F6423F3F-CC5F-4781-A2BC-2D2890007BDA}" type="datetimeFigureOut">
               <a:rPr lang="ko-KR" altLang="en-US" smtClean="0"/>
-              <a:t>2023-05-15</a:t>
+              <a:t>2023-06-05</a:t>
             </a:fld>
             <a:endParaRPr lang="ko-KR" altLang="en-US"/>
           </a:p>
@@ -2080,7 +2085,7 @@
           <a:p>
             <a:fld id="{F6423F3F-CC5F-4781-A2BC-2D2890007BDA}" type="datetimeFigureOut">
               <a:rPr lang="ko-KR" altLang="en-US" smtClean="0"/>
-              <a:t>2023-05-15</a:t>
+              <a:t>2023-06-05</a:t>
             </a:fld>
             <a:endParaRPr lang="ko-KR" altLang="en-US"/>
           </a:p>
@@ -2391,7 +2396,7 @@
           <a:p>
             <a:fld id="{F6423F3F-CC5F-4781-A2BC-2D2890007BDA}" type="datetimeFigureOut">
               <a:rPr lang="ko-KR" altLang="en-US" smtClean="0"/>
-              <a:t>2023-05-15</a:t>
+              <a:t>2023-06-05</a:t>
             </a:fld>
             <a:endParaRPr lang="ko-KR" altLang="en-US"/>
           </a:p>
@@ -2679,7 +2684,7 @@
           <a:p>
             <a:fld id="{F6423F3F-CC5F-4781-A2BC-2D2890007BDA}" type="datetimeFigureOut">
               <a:rPr lang="ko-KR" altLang="en-US" smtClean="0"/>
-              <a:t>2023-05-15</a:t>
+              <a:t>2023-06-05</a:t>
             </a:fld>
             <a:endParaRPr lang="ko-KR" altLang="en-US"/>
           </a:p>
@@ -2920,7 +2925,7 @@
           <a:p>
             <a:fld id="{F6423F3F-CC5F-4781-A2BC-2D2890007BDA}" type="datetimeFigureOut">
               <a:rPr lang="ko-KR" altLang="en-US" smtClean="0"/>
-              <a:t>2023-05-15</a:t>
+              <a:t>2023-06-05</a:t>
             </a:fld>
             <a:endParaRPr lang="ko-KR" altLang="en-US"/>
           </a:p>
@@ -4076,6 +4081,744 @@
     <p:extLst>
       <p:ext uri="{BB962C8B-B14F-4D97-AF65-F5344CB8AC3E}">
         <p14:creationId xmlns:p14="http://schemas.microsoft.com/office/powerpoint/2010/main" val="298374127"/>
+      </p:ext>
+    </p:extLst>
+  </p:cSld>
+  <p:clrMapOvr>
+    <a:masterClrMapping/>
+  </p:clrMapOvr>
+</p:sld>
+</file>
+
+<file path=ppt/slides/slide13.xml><?xml version="1.0" encoding="utf-8"?>
+<p:sld xmlns:a="http://schemas.openxmlformats.org/drawingml/2006/main" xmlns:r="http://schemas.openxmlformats.org/officeDocument/2006/relationships" xmlns:p="http://schemas.openxmlformats.org/presentationml/2006/main">
+  <p:cSld>
+    <p:spTree>
+      <p:nvGrpSpPr>
+        <p:cNvPr id="1" name=""/>
+        <p:cNvGrpSpPr/>
+        <p:nvPr/>
+      </p:nvGrpSpPr>
+      <p:grpSpPr>
+        <a:xfrm>
+          <a:off x="0" y="0"/>
+          <a:ext cx="0" cy="0"/>
+          <a:chOff x="0" y="0"/>
+          <a:chExt cx="0" cy="0"/>
+        </a:xfrm>
+      </p:grpSpPr>
+      <p:pic>
+        <p:nvPicPr>
+          <p:cNvPr id="3" name="그림 2">
+            <a:extLst>
+              <a:ext uri="{FF2B5EF4-FFF2-40B4-BE49-F238E27FC236}">
+                <a16:creationId xmlns:a16="http://schemas.microsoft.com/office/drawing/2014/main" id="{AF649E93-94BF-CCCA-8DFA-62D6D0CE3E4D}"/>
+              </a:ext>
+            </a:extLst>
+          </p:cNvPr>
+          <p:cNvPicPr>
+            <a:picLocks noChangeAspect="1"/>
+          </p:cNvPicPr>
+          <p:nvPr/>
+        </p:nvPicPr>
+        <p:blipFill>
+          <a:blip r:embed="rId2"/>
+          <a:stretch>
+            <a:fillRect/>
+          </a:stretch>
+        </p:blipFill>
+        <p:spPr>
+          <a:xfrm>
+            <a:off x="438150" y="654987"/>
+            <a:ext cx="11315700" cy="5997939"/>
+          </a:xfrm>
+          <a:prstGeom prst="rect">
+            <a:avLst/>
+          </a:prstGeom>
+        </p:spPr>
+      </p:pic>
+      <p:sp>
+        <p:nvSpPr>
+          <p:cNvPr id="4" name="TextBox 3">
+            <a:extLst>
+              <a:ext uri="{FF2B5EF4-FFF2-40B4-BE49-F238E27FC236}">
+                <a16:creationId xmlns:a16="http://schemas.microsoft.com/office/drawing/2014/main" id="{5D730316-397E-8FD6-BF27-0F8903D8D900}"/>
+              </a:ext>
+            </a:extLst>
+          </p:cNvPr>
+          <p:cNvSpPr txBox="1"/>
+          <p:nvPr/>
+        </p:nvSpPr>
+        <p:spPr>
+          <a:xfrm>
+            <a:off x="438150" y="162427"/>
+            <a:ext cx="5944603" cy="369332"/>
+          </a:xfrm>
+          <a:prstGeom prst="rect">
+            <a:avLst/>
+          </a:prstGeom>
+          <a:noFill/>
+        </p:spPr>
+        <p:txBody>
+          <a:bodyPr wrap="square" rtlCol="0">
+            <a:spAutoFit/>
+          </a:bodyPr>
+          <a:lstStyle/>
+          <a:p>
+            <a:r>
+              <a:rPr lang="en-US" altLang="ko-KR" dirty="0"/>
+              <a:t>2023.06.03 – </a:t>
+            </a:r>
+            <a:r>
+              <a:rPr lang="ko-KR" altLang="en-US" dirty="0"/>
+              <a:t>업무</a:t>
+            </a:r>
+            <a:r>
+              <a:rPr lang="en-US" altLang="ko-KR" dirty="0"/>
+              <a:t>(Task)</a:t>
+            </a:r>
+            <a:r>
+              <a:rPr lang="ko-KR" altLang="en-US" dirty="0"/>
+              <a:t> 저장 및 일정</a:t>
+            </a:r>
+            <a:r>
+              <a:rPr lang="en-US" altLang="ko-KR" dirty="0"/>
+              <a:t>(Lists) </a:t>
+            </a:r>
+            <a:r>
+              <a:rPr lang="ko-KR" altLang="en-US" dirty="0"/>
+              <a:t>개수 증가 </a:t>
+            </a:r>
+          </a:p>
+        </p:txBody>
+      </p:sp>
+    </p:spTree>
+    <p:extLst>
+      <p:ext uri="{BB962C8B-B14F-4D97-AF65-F5344CB8AC3E}">
+        <p14:creationId xmlns:p14="http://schemas.microsoft.com/office/powerpoint/2010/main" val="694014398"/>
+      </p:ext>
+    </p:extLst>
+  </p:cSld>
+  <p:clrMapOvr>
+    <a:masterClrMapping/>
+  </p:clrMapOvr>
+</p:sld>
+</file>
+
+<file path=ppt/slides/slide14.xml><?xml version="1.0" encoding="utf-8"?>
+<p:sld xmlns:a="http://schemas.openxmlformats.org/drawingml/2006/main" xmlns:r="http://schemas.openxmlformats.org/officeDocument/2006/relationships" xmlns:p="http://schemas.openxmlformats.org/presentationml/2006/main">
+  <p:cSld>
+    <p:spTree>
+      <p:nvGrpSpPr>
+        <p:cNvPr id="1" name=""/>
+        <p:cNvGrpSpPr/>
+        <p:nvPr/>
+      </p:nvGrpSpPr>
+      <p:grpSpPr>
+        <a:xfrm>
+          <a:off x="0" y="0"/>
+          <a:ext cx="0" cy="0"/>
+          <a:chOff x="0" y="0"/>
+          <a:chExt cx="0" cy="0"/>
+        </a:xfrm>
+      </p:grpSpPr>
+      <p:sp>
+        <p:nvSpPr>
+          <p:cNvPr id="4" name="TextBox 3">
+            <a:extLst>
+              <a:ext uri="{FF2B5EF4-FFF2-40B4-BE49-F238E27FC236}">
+                <a16:creationId xmlns:a16="http://schemas.microsoft.com/office/drawing/2014/main" id="{AEC7EF05-702D-59BB-3F5D-00A5E8349AA7}"/>
+              </a:ext>
+            </a:extLst>
+          </p:cNvPr>
+          <p:cNvSpPr txBox="1"/>
+          <p:nvPr/>
+        </p:nvSpPr>
+        <p:spPr>
+          <a:xfrm>
+            <a:off x="72189" y="108284"/>
+            <a:ext cx="12025564" cy="2031325"/>
+          </a:xfrm>
+          <a:prstGeom prst="rect">
+            <a:avLst/>
+          </a:prstGeom>
+          <a:noFill/>
+        </p:spPr>
+        <p:txBody>
+          <a:bodyPr wrap="square" rtlCol="0">
+            <a:spAutoFit/>
+          </a:bodyPr>
+          <a:lstStyle/>
+          <a:p>
+            <a:r>
+              <a:rPr lang="ko-KR" altLang="en-US" dirty="0"/>
+              <a:t>매일 </a:t>
+            </a:r>
+            <a:r>
+              <a:rPr lang="en-US" altLang="ko-KR" dirty="0"/>
+              <a:t>Lists </a:t>
+            </a:r>
+            <a:r>
+              <a:rPr lang="ko-KR" altLang="en-US" dirty="0"/>
+              <a:t>테이블에 해당 날짜를 가지고 컬럼 추가</a:t>
+            </a:r>
+            <a:r>
+              <a:rPr lang="en-US" altLang="ko-KR" dirty="0"/>
+              <a:t>! -&gt; </a:t>
+            </a:r>
+            <a:r>
+              <a:rPr lang="ko-KR" altLang="en-US" dirty="0"/>
+              <a:t>계획을 세우지 않는 날도 있겠지만 나중에 달력에 표시할 때 더 편하게 업무 개수를 불러올 수 있을 수 있기 때문이다</a:t>
+            </a:r>
+            <a:r>
+              <a:rPr lang="en-US" altLang="ko-KR" dirty="0"/>
+              <a:t>. </a:t>
+            </a:r>
+          </a:p>
+          <a:p>
+            <a:endParaRPr lang="en-US" altLang="ko-KR" dirty="0"/>
+          </a:p>
+          <a:p>
+            <a:r>
+              <a:rPr lang="ko-KR" altLang="en-US" dirty="0"/>
+              <a:t>업무가 추가 될 때 마다 일정 테이블의 </a:t>
+            </a:r>
+            <a:r>
+              <a:rPr lang="en-US" altLang="ko-KR" dirty="0"/>
+              <a:t>count </a:t>
+            </a:r>
+            <a:r>
+              <a:rPr lang="ko-KR" altLang="en-US" dirty="0"/>
+              <a:t>속성 개수 증가</a:t>
+            </a:r>
+            <a:r>
+              <a:rPr lang="en-US" altLang="ko-KR" dirty="0"/>
+              <a:t>, </a:t>
+            </a:r>
+            <a:r>
+              <a:rPr lang="ko-KR" altLang="en-US" dirty="0"/>
+              <a:t>업무 테이블의 </a:t>
+            </a:r>
+            <a:r>
+              <a:rPr lang="en-US" altLang="ko-KR" dirty="0" err="1"/>
+              <a:t>lists_id</a:t>
+            </a:r>
+            <a:r>
+              <a:rPr lang="en-US" altLang="ko-KR" dirty="0"/>
+              <a:t> </a:t>
+            </a:r>
+            <a:r>
+              <a:rPr lang="ko-KR" altLang="en-US" dirty="0"/>
+              <a:t>속성에도 해당 날짜에 맞게 </a:t>
+            </a:r>
+            <a:r>
+              <a:rPr lang="en-US" altLang="ko-KR" dirty="0"/>
+              <a:t>task </a:t>
+            </a:r>
+            <a:r>
+              <a:rPr lang="ko-KR" altLang="en-US" dirty="0"/>
+              <a:t>컬럼에 </a:t>
+            </a:r>
+            <a:r>
+              <a:rPr lang="en-US" altLang="ko-KR" dirty="0" err="1"/>
+              <a:t>lists_id</a:t>
+            </a:r>
+            <a:r>
+              <a:rPr lang="en-US" altLang="ko-KR" dirty="0"/>
+              <a:t> </a:t>
+            </a:r>
+            <a:r>
+              <a:rPr lang="ko-KR" altLang="en-US" dirty="0" err="1"/>
+              <a:t>넣어줌</a:t>
+            </a:r>
+            <a:endParaRPr lang="en-US" altLang="ko-KR" dirty="0"/>
+          </a:p>
+          <a:p>
+            <a:endParaRPr lang="en-US" altLang="ko-KR" dirty="0"/>
+          </a:p>
+          <a:p>
+            <a:r>
+              <a:rPr lang="ko-KR" altLang="en-US" dirty="0"/>
+              <a:t>업무를 삭제 했을 때 카운트가 줄어드는 것은 </a:t>
+            </a:r>
+            <a:r>
+              <a:rPr lang="en-US" altLang="ko-KR" dirty="0" err="1"/>
+              <a:t>removeOne</a:t>
+            </a:r>
+            <a:r>
+              <a:rPr lang="en-US" altLang="ko-KR" dirty="0"/>
+              <a:t>()</a:t>
+            </a:r>
+            <a:r>
+              <a:rPr lang="ko-KR" altLang="en-US" dirty="0"/>
+              <a:t>에서 구현예정</a:t>
+            </a:r>
+          </a:p>
+        </p:txBody>
+      </p:sp>
+    </p:spTree>
+    <p:extLst>
+      <p:ext uri="{BB962C8B-B14F-4D97-AF65-F5344CB8AC3E}">
+        <p14:creationId xmlns:p14="http://schemas.microsoft.com/office/powerpoint/2010/main" val="1766875872"/>
+      </p:ext>
+    </p:extLst>
+  </p:cSld>
+  <p:clrMapOvr>
+    <a:masterClrMapping/>
+  </p:clrMapOvr>
+</p:sld>
+</file>
+
+<file path=ppt/slides/slide15.xml><?xml version="1.0" encoding="utf-8"?>
+<p:sld xmlns:a="http://schemas.openxmlformats.org/drawingml/2006/main" xmlns:r="http://schemas.openxmlformats.org/officeDocument/2006/relationships" xmlns:p="http://schemas.openxmlformats.org/presentationml/2006/main">
+  <p:cSld>
+    <p:spTree>
+      <p:nvGrpSpPr>
+        <p:cNvPr id="1" name=""/>
+        <p:cNvGrpSpPr/>
+        <p:nvPr/>
+      </p:nvGrpSpPr>
+      <p:grpSpPr>
+        <a:xfrm>
+          <a:off x="0" y="0"/>
+          <a:ext cx="0" cy="0"/>
+          <a:chOff x="0" y="0"/>
+          <a:chExt cx="0" cy="0"/>
+        </a:xfrm>
+      </p:grpSpPr>
+      <p:sp>
+        <p:nvSpPr>
+          <p:cNvPr id="2" name="TextBox 1">
+            <a:extLst>
+              <a:ext uri="{FF2B5EF4-FFF2-40B4-BE49-F238E27FC236}">
+                <a16:creationId xmlns:a16="http://schemas.microsoft.com/office/drawing/2014/main" id="{FA836470-6424-5343-5EA8-5A8E030BC659}"/>
+              </a:ext>
+            </a:extLst>
+          </p:cNvPr>
+          <p:cNvSpPr txBox="1"/>
+          <p:nvPr/>
+        </p:nvSpPr>
+        <p:spPr>
+          <a:xfrm>
+            <a:off x="74645" y="139959"/>
+            <a:ext cx="11709918" cy="800219"/>
+          </a:xfrm>
+          <a:prstGeom prst="rect">
+            <a:avLst/>
+          </a:prstGeom>
+          <a:noFill/>
+        </p:spPr>
+        <p:txBody>
+          <a:bodyPr wrap="square" rtlCol="0">
+            <a:spAutoFit/>
+          </a:bodyPr>
+          <a:lstStyle/>
+          <a:p>
+            <a:r>
+              <a:rPr lang="en-US" altLang="ko-KR" dirty="0"/>
+              <a:t>2023/06/04 Task </a:t>
+            </a:r>
+            <a:r>
+              <a:rPr lang="ko-KR" altLang="en-US" dirty="0"/>
+              <a:t>업무 삭제 기능 개발</a:t>
+            </a:r>
+            <a:endParaRPr lang="en-US" altLang="ko-KR" dirty="0"/>
+          </a:p>
+          <a:p>
+            <a:r>
+              <a:rPr lang="ko-KR" altLang="en-US" sz="1400" dirty="0"/>
+              <a:t>사진은 오늘의 일정 컬럼과 업무 </a:t>
+            </a:r>
+            <a:r>
+              <a:rPr lang="en-US" altLang="ko-KR" sz="1400" dirty="0"/>
+              <a:t>1</a:t>
+            </a:r>
+            <a:r>
+              <a:rPr lang="ko-KR" altLang="en-US" sz="1400" dirty="0"/>
+              <a:t>개를 추가 한 상태 </a:t>
+            </a:r>
+            <a:endParaRPr lang="en-US" altLang="ko-KR" sz="1400" dirty="0"/>
+          </a:p>
+          <a:p>
+            <a:r>
+              <a:rPr lang="ko-KR" altLang="en-US" sz="1400" dirty="0"/>
+              <a:t>이 상태에서 업무 삭제 </a:t>
+            </a:r>
+            <a:r>
+              <a:rPr lang="en-US" altLang="ko-KR" sz="1400" dirty="0"/>
+              <a:t>test</a:t>
+            </a:r>
+            <a:r>
+              <a:rPr lang="ko-KR" altLang="en-US" sz="1400" dirty="0"/>
+              <a:t>를 진행했을 때 업무 </a:t>
+            </a:r>
+            <a:r>
+              <a:rPr lang="en-US" altLang="ko-KR" sz="1400" dirty="0"/>
+              <a:t>1</a:t>
+            </a:r>
+            <a:r>
+              <a:rPr lang="ko-KR" altLang="en-US" sz="1400" dirty="0"/>
+              <a:t>개가 잘 삭제되고 일정 컬럼의 </a:t>
+            </a:r>
+            <a:r>
+              <a:rPr lang="en-US" altLang="ko-KR" sz="1400" dirty="0"/>
+              <a:t>count </a:t>
+            </a:r>
+            <a:r>
+              <a:rPr lang="ko-KR" altLang="en-US" sz="1400" dirty="0"/>
+              <a:t>속성값이 </a:t>
+            </a:r>
+            <a:r>
+              <a:rPr lang="en-US" altLang="ko-KR" sz="1400" dirty="0"/>
+              <a:t>0</a:t>
+            </a:r>
+            <a:r>
+              <a:rPr lang="ko-KR" altLang="en-US" sz="1400" dirty="0"/>
+              <a:t>으로 변하면 </a:t>
+            </a:r>
+            <a:r>
+              <a:rPr lang="en-US" altLang="ko-KR" sz="1400" dirty="0"/>
+              <a:t>test </a:t>
+            </a:r>
+            <a:r>
+              <a:rPr lang="ko-KR" altLang="en-US" sz="1400" dirty="0"/>
+              <a:t>성공</a:t>
+            </a:r>
+            <a:r>
+              <a:rPr lang="en-US" altLang="ko-KR" sz="1400" dirty="0"/>
+              <a:t>! </a:t>
+            </a:r>
+          </a:p>
+        </p:txBody>
+      </p:sp>
+      <p:pic>
+        <p:nvPicPr>
+          <p:cNvPr id="4" name="그림 3">
+            <a:extLst>
+              <a:ext uri="{FF2B5EF4-FFF2-40B4-BE49-F238E27FC236}">
+                <a16:creationId xmlns:a16="http://schemas.microsoft.com/office/drawing/2014/main" id="{13229E95-607C-3BBC-2F4F-F30EE0B88063}"/>
+              </a:ext>
+            </a:extLst>
+          </p:cNvPr>
+          <p:cNvPicPr>
+            <a:picLocks noChangeAspect="1"/>
+          </p:cNvPicPr>
+          <p:nvPr/>
+        </p:nvPicPr>
+        <p:blipFill>
+          <a:blip r:embed="rId2"/>
+          <a:stretch>
+            <a:fillRect/>
+          </a:stretch>
+        </p:blipFill>
+        <p:spPr>
+          <a:xfrm>
+            <a:off x="74645" y="1192357"/>
+            <a:ext cx="8565502" cy="5525684"/>
+          </a:xfrm>
+          <a:prstGeom prst="rect">
+            <a:avLst/>
+          </a:prstGeom>
+        </p:spPr>
+      </p:pic>
+    </p:spTree>
+    <p:extLst>
+      <p:ext uri="{BB962C8B-B14F-4D97-AF65-F5344CB8AC3E}">
+        <p14:creationId xmlns:p14="http://schemas.microsoft.com/office/powerpoint/2010/main" val="912045763"/>
+      </p:ext>
+    </p:extLst>
+  </p:cSld>
+  <p:clrMapOvr>
+    <a:masterClrMapping/>
+  </p:clrMapOvr>
+</p:sld>
+</file>
+
+<file path=ppt/slides/slide16.xml><?xml version="1.0" encoding="utf-8"?>
+<p:sld xmlns:a="http://schemas.openxmlformats.org/drawingml/2006/main" xmlns:r="http://schemas.openxmlformats.org/officeDocument/2006/relationships" xmlns:p="http://schemas.openxmlformats.org/presentationml/2006/main">
+  <p:cSld>
+    <p:spTree>
+      <p:nvGrpSpPr>
+        <p:cNvPr id="1" name=""/>
+        <p:cNvGrpSpPr/>
+        <p:nvPr/>
+      </p:nvGrpSpPr>
+      <p:grpSpPr>
+        <a:xfrm>
+          <a:off x="0" y="0"/>
+          <a:ext cx="0" cy="0"/>
+          <a:chOff x="0" y="0"/>
+          <a:chExt cx="0" cy="0"/>
+        </a:xfrm>
+      </p:grpSpPr>
+      <p:pic>
+        <p:nvPicPr>
+          <p:cNvPr id="3" name="그림 2">
+            <a:extLst>
+              <a:ext uri="{FF2B5EF4-FFF2-40B4-BE49-F238E27FC236}">
+                <a16:creationId xmlns:a16="http://schemas.microsoft.com/office/drawing/2014/main" id="{48E4CDF6-9421-6F36-F121-3AC0CCAF8DFB}"/>
+              </a:ext>
+            </a:extLst>
+          </p:cNvPr>
+          <p:cNvPicPr>
+            <a:picLocks noChangeAspect="1"/>
+          </p:cNvPicPr>
+          <p:nvPr/>
+        </p:nvPicPr>
+        <p:blipFill>
+          <a:blip r:embed="rId2"/>
+          <a:stretch>
+            <a:fillRect/>
+          </a:stretch>
+        </p:blipFill>
+        <p:spPr>
+          <a:xfrm>
+            <a:off x="1141445" y="1138335"/>
+            <a:ext cx="9909110" cy="5573874"/>
+          </a:xfrm>
+          <a:prstGeom prst="rect">
+            <a:avLst/>
+          </a:prstGeom>
+        </p:spPr>
+      </p:pic>
+      <p:sp>
+        <p:nvSpPr>
+          <p:cNvPr id="4" name="TextBox 3">
+            <a:extLst>
+              <a:ext uri="{FF2B5EF4-FFF2-40B4-BE49-F238E27FC236}">
+                <a16:creationId xmlns:a16="http://schemas.microsoft.com/office/drawing/2014/main" id="{6A34C6E5-B53A-1664-639E-5DE9A5FB88F6}"/>
+              </a:ext>
+            </a:extLst>
+          </p:cNvPr>
+          <p:cNvSpPr txBox="1"/>
+          <p:nvPr/>
+        </p:nvSpPr>
+        <p:spPr>
+          <a:xfrm>
+            <a:off x="205273" y="195943"/>
+            <a:ext cx="11579290" cy="369332"/>
+          </a:xfrm>
+          <a:prstGeom prst="rect">
+            <a:avLst/>
+          </a:prstGeom>
+          <a:noFill/>
+        </p:spPr>
+        <p:txBody>
+          <a:bodyPr wrap="square" rtlCol="0">
+            <a:spAutoFit/>
+          </a:bodyPr>
+          <a:lstStyle/>
+          <a:p>
+            <a:r>
+              <a:rPr lang="en-US" altLang="ko-KR" dirty="0"/>
+              <a:t>Delete</a:t>
+            </a:r>
+            <a:r>
+              <a:rPr lang="ko-KR" altLang="en-US" dirty="0"/>
+              <a:t> </a:t>
+            </a:r>
+            <a:r>
+              <a:rPr lang="en-US" altLang="ko-KR" dirty="0" err="1"/>
+              <a:t>jpql</a:t>
+            </a:r>
+            <a:r>
+              <a:rPr lang="en-US" altLang="ko-KR" dirty="0"/>
+              <a:t> </a:t>
+            </a:r>
+            <a:r>
+              <a:rPr lang="ko-KR" altLang="en-US"/>
+              <a:t>부분에서 오류 발생</a:t>
+            </a:r>
+          </a:p>
+        </p:txBody>
+      </p:sp>
+    </p:spTree>
+    <p:extLst>
+      <p:ext uri="{BB962C8B-B14F-4D97-AF65-F5344CB8AC3E}">
+        <p14:creationId xmlns:p14="http://schemas.microsoft.com/office/powerpoint/2010/main" val="565607516"/>
+      </p:ext>
+    </p:extLst>
+  </p:cSld>
+  <p:clrMapOvr>
+    <a:masterClrMapping/>
+  </p:clrMapOvr>
+</p:sld>
+</file>
+
+<file path=ppt/slides/slide17.xml><?xml version="1.0" encoding="utf-8"?>
+<p:sld xmlns:a="http://schemas.openxmlformats.org/drawingml/2006/main" xmlns:r="http://schemas.openxmlformats.org/officeDocument/2006/relationships" xmlns:p="http://schemas.openxmlformats.org/presentationml/2006/main">
+  <p:cSld>
+    <p:spTree>
+      <p:nvGrpSpPr>
+        <p:cNvPr id="1" name=""/>
+        <p:cNvGrpSpPr/>
+        <p:nvPr/>
+      </p:nvGrpSpPr>
+      <p:grpSpPr>
+        <a:xfrm>
+          <a:off x="0" y="0"/>
+          <a:ext cx="0" cy="0"/>
+          <a:chOff x="0" y="0"/>
+          <a:chExt cx="0" cy="0"/>
+        </a:xfrm>
+      </p:grpSpPr>
+      <p:pic>
+        <p:nvPicPr>
+          <p:cNvPr id="3" name="그림 2">
+            <a:extLst>
+              <a:ext uri="{FF2B5EF4-FFF2-40B4-BE49-F238E27FC236}">
+                <a16:creationId xmlns:a16="http://schemas.microsoft.com/office/drawing/2014/main" id="{619C3B7C-EB25-0D73-CF20-495382314A05}"/>
+              </a:ext>
+            </a:extLst>
+          </p:cNvPr>
+          <p:cNvPicPr>
+            <a:picLocks noChangeAspect="1"/>
+          </p:cNvPicPr>
+          <p:nvPr/>
+        </p:nvPicPr>
+        <p:blipFill>
+          <a:blip r:embed="rId2"/>
+          <a:stretch>
+            <a:fillRect/>
+          </a:stretch>
+        </p:blipFill>
+        <p:spPr>
+          <a:xfrm>
+            <a:off x="198521" y="1245689"/>
+            <a:ext cx="11105148" cy="5326971"/>
+          </a:xfrm>
+          <a:prstGeom prst="rect">
+            <a:avLst/>
+          </a:prstGeom>
+        </p:spPr>
+      </p:pic>
+      <p:sp>
+        <p:nvSpPr>
+          <p:cNvPr id="4" name="TextBox 3">
+            <a:extLst>
+              <a:ext uri="{FF2B5EF4-FFF2-40B4-BE49-F238E27FC236}">
+                <a16:creationId xmlns:a16="http://schemas.microsoft.com/office/drawing/2014/main" id="{6FC71E59-6B4E-B234-F77B-1746B533C059}"/>
+              </a:ext>
+            </a:extLst>
+          </p:cNvPr>
+          <p:cNvSpPr txBox="1"/>
+          <p:nvPr/>
+        </p:nvSpPr>
+        <p:spPr>
+          <a:xfrm>
+            <a:off x="0" y="0"/>
+            <a:ext cx="11827042" cy="1200329"/>
+          </a:xfrm>
+          <a:prstGeom prst="rect">
+            <a:avLst/>
+          </a:prstGeom>
+          <a:noFill/>
+        </p:spPr>
+        <p:txBody>
+          <a:bodyPr wrap="square" rtlCol="0">
+            <a:spAutoFit/>
+          </a:bodyPr>
+          <a:lstStyle/>
+          <a:p>
+            <a:r>
+              <a:rPr lang="en-US" altLang="ko-KR" dirty="0"/>
+              <a:t>2023/06/05 – </a:t>
+            </a:r>
+            <a:r>
+              <a:rPr lang="ko-KR" altLang="en-US" dirty="0"/>
+              <a:t>업무 하나 삭제 성공</a:t>
+            </a:r>
+            <a:r>
+              <a:rPr lang="en-US" altLang="ko-KR" dirty="0"/>
+              <a:t>!! </a:t>
+            </a:r>
+          </a:p>
+          <a:p>
+            <a:r>
+              <a:rPr lang="en-US" altLang="ko-KR" dirty="0"/>
+              <a:t>delete query</a:t>
+            </a:r>
+            <a:r>
+              <a:rPr lang="ko-KR" altLang="en-US" dirty="0"/>
+              <a:t>에는 반환 값이 없는데 반환 결과를 매핑 시켜주는 </a:t>
+            </a:r>
+            <a:r>
+              <a:rPr lang="en-US" altLang="ko-KR" dirty="0" err="1"/>
+              <a:t>Task.class</a:t>
+            </a:r>
+            <a:r>
+              <a:rPr lang="ko-KR" altLang="en-US" dirty="0"/>
+              <a:t>를 </a:t>
+            </a:r>
+            <a:r>
+              <a:rPr lang="en-US" altLang="ko-KR" dirty="0" err="1"/>
+              <a:t>createQuery</a:t>
+            </a:r>
+            <a:r>
+              <a:rPr lang="en-US" altLang="ko-KR" dirty="0"/>
+              <a:t>()</a:t>
+            </a:r>
+            <a:r>
+              <a:rPr lang="ko-KR" altLang="en-US" dirty="0"/>
+              <a:t>의 매개변수로 사용해서 오류가 발생함</a:t>
+            </a:r>
+            <a:r>
+              <a:rPr lang="en-US" altLang="ko-KR" dirty="0"/>
+              <a:t>.</a:t>
+            </a:r>
+            <a:r>
+              <a:rPr lang="ko-KR" altLang="en-US" dirty="0"/>
+              <a:t> 검색 결과 </a:t>
+            </a:r>
+            <a:r>
+              <a:rPr lang="en-US" altLang="ko-KR" dirty="0" err="1"/>
+              <a:t>Task.class</a:t>
+            </a:r>
+            <a:r>
+              <a:rPr lang="ko-KR" altLang="en-US" dirty="0"/>
+              <a:t>라는 매개변수는 </a:t>
+            </a:r>
+            <a:r>
+              <a:rPr lang="en-US" altLang="ko-KR" dirty="0"/>
+              <a:t>select</a:t>
+            </a:r>
+            <a:r>
+              <a:rPr lang="ko-KR" altLang="en-US" dirty="0"/>
+              <a:t> 쿼리를 사용할 때만 넣어주면 되는 거임</a:t>
+            </a:r>
+            <a:r>
+              <a:rPr lang="en-US" altLang="ko-KR" dirty="0"/>
+              <a:t>!</a:t>
+            </a:r>
+          </a:p>
+          <a:p>
+            <a:r>
+              <a:rPr lang="ko-KR" altLang="en-US" dirty="0"/>
+              <a:t>* 추가로 </a:t>
+            </a:r>
+            <a:r>
+              <a:rPr lang="en-US" altLang="ko-KR" dirty="0" err="1"/>
+              <a:t>getResultList</a:t>
+            </a:r>
+            <a:r>
+              <a:rPr lang="en-US" altLang="ko-KR" dirty="0"/>
+              <a:t>() </a:t>
+            </a:r>
+            <a:r>
+              <a:rPr lang="ko-KR" altLang="en-US" dirty="0"/>
+              <a:t>와 같은 메서드 사용도 안됨</a:t>
+            </a:r>
+            <a:r>
+              <a:rPr lang="en-US" altLang="ko-KR" dirty="0"/>
+              <a:t>.</a:t>
+            </a:r>
+          </a:p>
+        </p:txBody>
+      </p:sp>
+    </p:spTree>
+    <p:extLst>
+      <p:ext uri="{BB962C8B-B14F-4D97-AF65-F5344CB8AC3E}">
+        <p14:creationId xmlns:p14="http://schemas.microsoft.com/office/powerpoint/2010/main" val="1593361024"/>
       </p:ext>
     </p:extLst>
   </p:cSld>

</xml_diff>